<commit_message>
enabled endless loop slideshow for pptx
</commit_message>
<xml_diff>
--- a/assets/default.pptx
+++ b/assets/default.pptx
@@ -258,7 +258,7 @@
           <a:p>
             <a:fld id="{F5208315-6CCB-4D11-9B56-274516733FAA}" type="datetimeFigureOut">
               <a:rPr lang="ru-RU" smtClean="0"/>
-              <a:t>28.10.2023</a:t>
+              <a:t>16.02.2025</a:t>
             </a:fld>
             <a:endParaRPr lang="ru-RU"/>
           </a:p>
@@ -312,7 +312,7 @@
           <a:p>
             <a:fld id="{2BAC0F14-D7B0-4364-8C18-31116EEC6C50}" type="slidenum">
               <a:rPr lang="ru-RU" smtClean="0"/>
-              <a:t>‹№›</a:t>
+              <a:t>‹#›</a:t>
             </a:fld>
             <a:endParaRPr lang="ru-RU"/>
           </a:p>
@@ -458,7 +458,7 @@
           <a:p>
             <a:fld id="{F5208315-6CCB-4D11-9B56-274516733FAA}" type="datetimeFigureOut">
               <a:rPr lang="ru-RU" smtClean="0"/>
-              <a:t>28.10.2023</a:t>
+              <a:t>16.02.2025</a:t>
             </a:fld>
             <a:endParaRPr lang="ru-RU"/>
           </a:p>
@@ -512,7 +512,7 @@
           <a:p>
             <a:fld id="{2BAC0F14-D7B0-4364-8C18-31116EEC6C50}" type="slidenum">
               <a:rPr lang="ru-RU" smtClean="0"/>
-              <a:t>‹№›</a:t>
+              <a:t>‹#›</a:t>
             </a:fld>
             <a:endParaRPr lang="ru-RU"/>
           </a:p>
@@ -668,7 +668,7 @@
           <a:p>
             <a:fld id="{F5208315-6CCB-4D11-9B56-274516733FAA}" type="datetimeFigureOut">
               <a:rPr lang="ru-RU" smtClean="0"/>
-              <a:t>28.10.2023</a:t>
+              <a:t>16.02.2025</a:t>
             </a:fld>
             <a:endParaRPr lang="ru-RU"/>
           </a:p>
@@ -722,7 +722,7 @@
           <a:p>
             <a:fld id="{2BAC0F14-D7B0-4364-8C18-31116EEC6C50}" type="slidenum">
               <a:rPr lang="ru-RU" smtClean="0"/>
-              <a:t>‹№›</a:t>
+              <a:t>‹#›</a:t>
             </a:fld>
             <a:endParaRPr lang="ru-RU"/>
           </a:p>
@@ -868,7 +868,7 @@
           <a:p>
             <a:fld id="{F5208315-6CCB-4D11-9B56-274516733FAA}" type="datetimeFigureOut">
               <a:rPr lang="ru-RU" smtClean="0"/>
-              <a:t>28.10.2023</a:t>
+              <a:t>16.02.2025</a:t>
             </a:fld>
             <a:endParaRPr lang="ru-RU"/>
           </a:p>
@@ -922,7 +922,7 @@
           <a:p>
             <a:fld id="{2BAC0F14-D7B0-4364-8C18-31116EEC6C50}" type="slidenum">
               <a:rPr lang="ru-RU" smtClean="0"/>
-              <a:t>‹№›</a:t>
+              <a:t>‹#›</a:t>
             </a:fld>
             <a:endParaRPr lang="ru-RU"/>
           </a:p>
@@ -1144,7 +1144,7 @@
           <a:p>
             <a:fld id="{F5208315-6CCB-4D11-9B56-274516733FAA}" type="datetimeFigureOut">
               <a:rPr lang="ru-RU" smtClean="0"/>
-              <a:t>28.10.2023</a:t>
+              <a:t>16.02.2025</a:t>
             </a:fld>
             <a:endParaRPr lang="ru-RU"/>
           </a:p>
@@ -1198,7 +1198,7 @@
           <a:p>
             <a:fld id="{2BAC0F14-D7B0-4364-8C18-31116EEC6C50}" type="slidenum">
               <a:rPr lang="ru-RU" smtClean="0"/>
-              <a:t>‹№›</a:t>
+              <a:t>‹#›</a:t>
             </a:fld>
             <a:endParaRPr lang="ru-RU"/>
           </a:p>
@@ -1412,7 +1412,7 @@
           <a:p>
             <a:fld id="{F5208315-6CCB-4D11-9B56-274516733FAA}" type="datetimeFigureOut">
               <a:rPr lang="ru-RU" smtClean="0"/>
-              <a:t>28.10.2023</a:t>
+              <a:t>16.02.2025</a:t>
             </a:fld>
             <a:endParaRPr lang="ru-RU"/>
           </a:p>
@@ -1466,7 +1466,7 @@
           <a:p>
             <a:fld id="{2BAC0F14-D7B0-4364-8C18-31116EEC6C50}" type="slidenum">
               <a:rPr lang="ru-RU" smtClean="0"/>
-              <a:t>‹№›</a:t>
+              <a:t>‹#›</a:t>
             </a:fld>
             <a:endParaRPr lang="ru-RU"/>
           </a:p>
@@ -1827,7 +1827,7 @@
           <a:p>
             <a:fld id="{F5208315-6CCB-4D11-9B56-274516733FAA}" type="datetimeFigureOut">
               <a:rPr lang="ru-RU" smtClean="0"/>
-              <a:t>28.10.2023</a:t>
+              <a:t>16.02.2025</a:t>
             </a:fld>
             <a:endParaRPr lang="ru-RU"/>
           </a:p>
@@ -1881,7 +1881,7 @@
           <a:p>
             <a:fld id="{2BAC0F14-D7B0-4364-8C18-31116EEC6C50}" type="slidenum">
               <a:rPr lang="ru-RU" smtClean="0"/>
-              <a:t>‹№›</a:t>
+              <a:t>‹#›</a:t>
             </a:fld>
             <a:endParaRPr lang="ru-RU"/>
           </a:p>
@@ -1969,7 +1969,7 @@
           <a:p>
             <a:fld id="{F5208315-6CCB-4D11-9B56-274516733FAA}" type="datetimeFigureOut">
               <a:rPr lang="ru-RU" smtClean="0"/>
-              <a:t>28.10.2023</a:t>
+              <a:t>16.02.2025</a:t>
             </a:fld>
             <a:endParaRPr lang="ru-RU"/>
           </a:p>
@@ -2023,7 +2023,7 @@
           <a:p>
             <a:fld id="{2BAC0F14-D7B0-4364-8C18-31116EEC6C50}" type="slidenum">
               <a:rPr lang="ru-RU" smtClean="0"/>
-              <a:t>‹№›</a:t>
+              <a:t>‹#›</a:t>
             </a:fld>
             <a:endParaRPr lang="ru-RU"/>
           </a:p>
@@ -2082,7 +2082,7 @@
           <a:p>
             <a:fld id="{F5208315-6CCB-4D11-9B56-274516733FAA}" type="datetimeFigureOut">
               <a:rPr lang="ru-RU" smtClean="0"/>
-              <a:t>28.10.2023</a:t>
+              <a:t>16.02.2025</a:t>
             </a:fld>
             <a:endParaRPr lang="ru-RU"/>
           </a:p>
@@ -2136,7 +2136,7 @@
           <a:p>
             <a:fld id="{2BAC0F14-D7B0-4364-8C18-31116EEC6C50}" type="slidenum">
               <a:rPr lang="ru-RU" smtClean="0"/>
-              <a:t>‹№›</a:t>
+              <a:t>‹#›</a:t>
             </a:fld>
             <a:endParaRPr lang="ru-RU"/>
           </a:p>
@@ -2395,7 +2395,7 @@
           <a:p>
             <a:fld id="{F5208315-6CCB-4D11-9B56-274516733FAA}" type="datetimeFigureOut">
               <a:rPr lang="ru-RU" smtClean="0"/>
-              <a:t>28.10.2023</a:t>
+              <a:t>16.02.2025</a:t>
             </a:fld>
             <a:endParaRPr lang="ru-RU"/>
           </a:p>
@@ -2449,7 +2449,7 @@
           <a:p>
             <a:fld id="{2BAC0F14-D7B0-4364-8C18-31116EEC6C50}" type="slidenum">
               <a:rPr lang="ru-RU" smtClean="0"/>
-              <a:t>‹№›</a:t>
+              <a:t>‹#›</a:t>
             </a:fld>
             <a:endParaRPr lang="ru-RU"/>
           </a:p>
@@ -2684,7 +2684,7 @@
           <a:p>
             <a:fld id="{F5208315-6CCB-4D11-9B56-274516733FAA}" type="datetimeFigureOut">
               <a:rPr lang="ru-RU" smtClean="0"/>
-              <a:t>28.10.2023</a:t>
+              <a:t>16.02.2025</a:t>
             </a:fld>
             <a:endParaRPr lang="ru-RU"/>
           </a:p>
@@ -2738,7 +2738,7 @@
           <a:p>
             <a:fld id="{2BAC0F14-D7B0-4364-8C18-31116EEC6C50}" type="slidenum">
               <a:rPr lang="ru-RU" smtClean="0"/>
-              <a:t>‹№›</a:t>
+              <a:t>‹#›</a:t>
             </a:fld>
             <a:endParaRPr lang="ru-RU"/>
           </a:p>
@@ -2927,7 +2927,7 @@
           <a:p>
             <a:fld id="{F5208315-6CCB-4D11-9B56-274516733FAA}" type="datetimeFigureOut">
               <a:rPr lang="ru-RU" smtClean="0"/>
-              <a:t>28.10.2023</a:t>
+              <a:t>16.02.2025</a:t>
             </a:fld>
             <a:endParaRPr lang="ru-RU"/>
           </a:p>
@@ -3017,7 +3017,7 @@
           <a:p>
             <a:fld id="{2BAC0F14-D7B0-4364-8C18-31116EEC6C50}" type="slidenum">
               <a:rPr lang="ru-RU" smtClean="0"/>
-              <a:t>‹№›</a:t>
+              <a:t>‹#›</a:t>
             </a:fld>
             <a:endParaRPr lang="ru-RU"/>
           </a:p>

</xml_diff>